<commit_message>
final commit: added updated ppt and readme
</commit_message>
<xml_diff>
--- a/ppt/Wedding planner App presentation.pptx
+++ b/ppt/Wedding planner App presentation.pptx
@@ -161,7 +161,7 @@
 <file path=ppt/revisionInfo.xml><?xml version="1.0" encoding="utf-8"?>
 <p1510:revInfo xmlns:a="http://schemas.openxmlformats.org/drawingml/2006/main" xmlns:r="http://schemas.openxmlformats.org/officeDocument/2006/relationships" xmlns:p1510="http://schemas.microsoft.com/office/powerpoint/2015/10/main">
   <p1510:revLst>
-    <p1510:client id="{B60CC9B0-2A30-4645-8C53-3421A8BF3E96}" v="95" dt="2023-10-28T09:43:40.991"/>
+    <p1510:client id="{B60CC9B0-2A30-4645-8C53-3421A8BF3E96}" v="100" dt="2023-10-28T12:09:49.371"/>
   </p1510:revLst>
 </p1510:revInfo>
 </file>
@@ -171,7 +171,7 @@
   <pc:docChgLst>
     <pc:chgData name="Michelle Liang" userId="57f98c83a5a0b7ce" providerId="LiveId" clId="{B60CC9B0-2A30-4645-8C53-3421A8BF3E96}"/>
     <pc:docChg chg="undo redo custSel addSld delSld modSld sldOrd modNotesMaster modHandout">
-      <pc:chgData name="Michelle Liang" userId="57f98c83a5a0b7ce" providerId="LiveId" clId="{B60CC9B0-2A30-4645-8C53-3421A8BF3E96}" dt="2023-10-28T09:43:40.991" v="20333"/>
+      <pc:chgData name="Michelle Liang" userId="57f98c83a5a0b7ce" providerId="LiveId" clId="{B60CC9B0-2A30-4645-8C53-3421A8BF3E96}" dt="2023-10-28T12:09:49.371" v="21100" actId="164"/>
       <pc:docMkLst>
         <pc:docMk/>
       </pc:docMkLst>
@@ -2101,29 +2101,29 @@
         </pc:picChg>
       </pc:sldChg>
       <pc:sldChg chg="addSp delSp modSp add mod modNotesTx">
-        <pc:chgData name="Michelle Liang" userId="57f98c83a5a0b7ce" providerId="LiveId" clId="{B60CC9B0-2A30-4645-8C53-3421A8BF3E96}" dt="2023-10-28T09:22:43.579" v="20326" actId="113"/>
+        <pc:chgData name="Michelle Liang" userId="57f98c83a5a0b7ce" providerId="LiveId" clId="{B60CC9B0-2A30-4645-8C53-3421A8BF3E96}" dt="2023-10-28T12:09:49.371" v="21100" actId="164"/>
         <pc:sldMkLst>
           <pc:docMk/>
           <pc:sldMk cId="3965412272" sldId="326"/>
         </pc:sldMkLst>
         <pc:spChg chg="mod">
-          <ac:chgData name="Michelle Liang" userId="57f98c83a5a0b7ce" providerId="LiveId" clId="{B60CC9B0-2A30-4645-8C53-3421A8BF3E96}" dt="2023-10-28T09:22:43.579" v="20326" actId="113"/>
+          <ac:chgData name="Michelle Liang" userId="57f98c83a5a0b7ce" providerId="LiveId" clId="{B60CC9B0-2A30-4645-8C53-3421A8BF3E96}" dt="2023-10-28T12:03:03.386" v="20377" actId="20577"/>
           <ac:spMkLst>
             <pc:docMk/>
             <pc:sldMk cId="3965412272" sldId="326"/>
             <ac:spMk id="2" creationId="{A52DF72D-CD7A-130E-9991-6E06AF277FAB}"/>
           </ac:spMkLst>
         </pc:spChg>
-        <pc:spChg chg="add mod">
-          <ac:chgData name="Michelle Liang" userId="57f98c83a5a0b7ce" providerId="LiveId" clId="{B60CC9B0-2A30-4645-8C53-3421A8BF3E96}" dt="2023-10-28T08:53:00.711" v="15854" actId="164"/>
+        <pc:spChg chg="add mod ord topLvl">
+          <ac:chgData name="Michelle Liang" userId="57f98c83a5a0b7ce" providerId="LiveId" clId="{B60CC9B0-2A30-4645-8C53-3421A8BF3E96}" dt="2023-10-28T12:02:18.404" v="20346" actId="164"/>
           <ac:spMkLst>
             <pc:docMk/>
             <pc:sldMk cId="3965412272" sldId="326"/>
             <ac:spMk id="11" creationId="{D9233641-EAE9-F7C4-800A-36A29908232B}"/>
           </ac:spMkLst>
         </pc:spChg>
-        <pc:spChg chg="add mod">
-          <ac:chgData name="Michelle Liang" userId="57f98c83a5a0b7ce" providerId="LiveId" clId="{B60CC9B0-2A30-4645-8C53-3421A8BF3E96}" dt="2023-10-28T08:53:26.081" v="15860" actId="1076"/>
+        <pc:spChg chg="add mod ord topLvl">
+          <ac:chgData name="Michelle Liang" userId="57f98c83a5a0b7ce" providerId="LiveId" clId="{B60CC9B0-2A30-4645-8C53-3421A8BF3E96}" dt="2023-10-28T12:03:50.263" v="20387" actId="164"/>
           <ac:spMkLst>
             <pc:docMk/>
             <pc:sldMk cId="3965412272" sldId="326"/>
@@ -2131,31 +2131,71 @@
           </ac:spMkLst>
         </pc:spChg>
         <pc:spChg chg="add mod">
-          <ac:chgData name="Michelle Liang" userId="57f98c83a5a0b7ce" providerId="LiveId" clId="{B60CC9B0-2A30-4645-8C53-3421A8BF3E96}" dt="2023-10-28T08:53:34.056" v="15864" actId="20577"/>
+          <ac:chgData name="Michelle Liang" userId="57f98c83a5a0b7ce" providerId="LiveId" clId="{B60CC9B0-2A30-4645-8C53-3421A8BF3E96}" dt="2023-10-28T12:02:32" v="20351" actId="164"/>
           <ac:spMkLst>
             <pc:docMk/>
             <pc:sldMk cId="3965412272" sldId="326"/>
             <ac:spMk id="18" creationId="{A8570616-712A-AA01-28DB-CBE56FA32CF8}"/>
           </ac:spMkLst>
         </pc:spChg>
+        <pc:spChg chg="add mod">
+          <ac:chgData name="Michelle Liang" userId="57f98c83a5a0b7ce" providerId="LiveId" clId="{B60CC9B0-2A30-4645-8C53-3421A8BF3E96}" dt="2023-10-28T12:09:49.371" v="21100" actId="164"/>
+          <ac:spMkLst>
+            <pc:docMk/>
+            <pc:sldMk cId="3965412272" sldId="326"/>
+            <ac:spMk id="22" creationId="{605B5172-ED50-0727-F605-8A4494C721F8}"/>
+          </ac:spMkLst>
+        </pc:spChg>
         <pc:grpChg chg="add mod">
-          <ac:chgData name="Michelle Liang" userId="57f98c83a5a0b7ce" providerId="LiveId" clId="{B60CC9B0-2A30-4645-8C53-3421A8BF3E96}" dt="2023-10-28T08:53:00.711" v="15854" actId="164"/>
+          <ac:chgData name="Michelle Liang" userId="57f98c83a5a0b7ce" providerId="LiveId" clId="{B60CC9B0-2A30-4645-8C53-3421A8BF3E96}" dt="2023-10-28T12:03:07.398" v="20379" actId="1076"/>
+          <ac:grpSpMkLst>
+            <pc:docMk/>
+            <pc:sldMk cId="3965412272" sldId="326"/>
+            <ac:grpSpMk id="9" creationId="{EFCECCC4-4C4F-9835-A04D-964B7792FA43}"/>
+          </ac:grpSpMkLst>
+        </pc:grpChg>
+        <pc:grpChg chg="add del mod">
+          <ac:chgData name="Michelle Liang" userId="57f98c83a5a0b7ce" providerId="LiveId" clId="{B60CC9B0-2A30-4645-8C53-3421A8BF3E96}" dt="2023-10-28T12:01:37.048" v="20334" actId="478"/>
           <ac:grpSpMkLst>
             <pc:docMk/>
             <pc:sldMk cId="3965412272" sldId="326"/>
             <ac:grpSpMk id="12" creationId="{BEB2DFE5-1164-EFFC-A0A8-62EBF233C75A}"/>
           </ac:grpSpMkLst>
         </pc:grpChg>
-        <pc:grpChg chg="add mod">
-          <ac:chgData name="Michelle Liang" userId="57f98c83a5a0b7ce" providerId="LiveId" clId="{B60CC9B0-2A30-4645-8C53-3421A8BF3E96}" dt="2023-10-28T08:53:18.126" v="15859" actId="164"/>
+        <pc:grpChg chg="add del mod">
+          <ac:chgData name="Michelle Liang" userId="57f98c83a5a0b7ce" providerId="LiveId" clId="{B60CC9B0-2A30-4645-8C53-3421A8BF3E96}" dt="2023-10-28T12:09:26.823" v="21090" actId="478"/>
+          <ac:grpSpMkLst>
+            <pc:docMk/>
+            <pc:sldMk cId="3965412272" sldId="326"/>
+            <ac:grpSpMk id="13" creationId="{F28C0FE8-3613-25EC-FA09-ED717D318840}"/>
+          </ac:grpSpMkLst>
+        </pc:grpChg>
+        <pc:grpChg chg="add del mod">
+          <ac:chgData name="Michelle Liang" userId="57f98c83a5a0b7ce" providerId="LiveId" clId="{B60CC9B0-2A30-4645-8C53-3421A8BF3E96}" dt="2023-10-28T12:03:12.403" v="20381" actId="478"/>
           <ac:grpSpMkLst>
             <pc:docMk/>
             <pc:sldMk cId="3965412272" sldId="326"/>
             <ac:grpSpMk id="16" creationId="{B47D0846-9D19-A4BC-1DBD-B631EC4616D4}"/>
           </ac:grpSpMkLst>
         </pc:grpChg>
-        <pc:picChg chg="add mod">
-          <ac:chgData name="Michelle Liang" userId="57f98c83a5a0b7ce" providerId="LiveId" clId="{B60CC9B0-2A30-4645-8C53-3421A8BF3E96}" dt="2023-10-28T08:53:00.711" v="15854" actId="164"/>
+        <pc:grpChg chg="add mod">
+          <ac:chgData name="Michelle Liang" userId="57f98c83a5a0b7ce" providerId="LiveId" clId="{B60CC9B0-2A30-4645-8C53-3421A8BF3E96}" dt="2023-10-28T12:03:52.889" v="20388" actId="1076"/>
+          <ac:grpSpMkLst>
+            <pc:docMk/>
+            <pc:sldMk cId="3965412272" sldId="326"/>
+            <ac:grpSpMk id="19" creationId="{4BB3B0E6-5AA7-F90A-9C6D-24F7A399A0DB}"/>
+          </ac:grpSpMkLst>
+        </pc:grpChg>
+        <pc:grpChg chg="add mod">
+          <ac:chgData name="Michelle Liang" userId="57f98c83a5a0b7ce" providerId="LiveId" clId="{B60CC9B0-2A30-4645-8C53-3421A8BF3E96}" dt="2023-10-28T12:09:49.371" v="21100" actId="164"/>
+          <ac:grpSpMkLst>
+            <pc:docMk/>
+            <pc:sldMk cId="3965412272" sldId="326"/>
+            <ac:grpSpMk id="23" creationId="{4E5039C4-0133-F935-C352-F7E74D3C515D}"/>
+          </ac:grpSpMkLst>
+        </pc:grpChg>
+        <pc:picChg chg="add del mod topLvl">
+          <ac:chgData name="Michelle Liang" userId="57f98c83a5a0b7ce" providerId="LiveId" clId="{B60CC9B0-2A30-4645-8C53-3421A8BF3E96}" dt="2023-10-28T12:01:37.048" v="20334" actId="478"/>
           <ac:picMkLst>
             <pc:docMk/>
             <pc:sldMk cId="3965412272" sldId="326"/>
@@ -2163,7 +2203,15 @@
           </ac:picMkLst>
         </pc:picChg>
         <pc:picChg chg="add mod">
-          <ac:chgData name="Michelle Liang" userId="57f98c83a5a0b7ce" providerId="LiveId" clId="{B60CC9B0-2A30-4645-8C53-3421A8BF3E96}" dt="2023-10-28T08:53:18.126" v="15859" actId="164"/>
+          <ac:chgData name="Michelle Liang" userId="57f98c83a5a0b7ce" providerId="LiveId" clId="{B60CC9B0-2A30-4645-8C53-3421A8BF3E96}" dt="2023-10-28T12:02:18.404" v="20346" actId="164"/>
+          <ac:picMkLst>
+            <pc:docMk/>
+            <pc:sldMk cId="3965412272" sldId="326"/>
+            <ac:picMk id="7" creationId="{62777A38-9C4D-E918-3ECF-F4DAED0071AF}"/>
+          </ac:picMkLst>
+        </pc:picChg>
+        <pc:picChg chg="add del mod topLvl">
+          <ac:chgData name="Michelle Liang" userId="57f98c83a5a0b7ce" providerId="LiveId" clId="{B60CC9B0-2A30-4645-8C53-3421A8BF3E96}" dt="2023-10-28T12:03:12.403" v="20381" actId="478"/>
           <ac:picMkLst>
             <pc:docMk/>
             <pc:sldMk cId="3965412272" sldId="326"/>
@@ -2171,7 +2219,7 @@
           </ac:picMkLst>
         </pc:picChg>
         <pc:picChg chg="add mod">
-          <ac:chgData name="Michelle Liang" userId="57f98c83a5a0b7ce" providerId="LiveId" clId="{B60CC9B0-2A30-4645-8C53-3421A8BF3E96}" dt="2023-10-28T08:42:09.179" v="15845" actId="1076"/>
+          <ac:chgData name="Michelle Liang" userId="57f98c83a5a0b7ce" providerId="LiveId" clId="{B60CC9B0-2A30-4645-8C53-3421A8BF3E96}" dt="2023-10-28T12:02:32" v="20351" actId="164"/>
           <ac:picMkLst>
             <pc:docMk/>
             <pc:sldMk cId="3965412272" sldId="326"/>
@@ -2200,6 +2248,22 @@
             <pc:docMk/>
             <pc:sldMk cId="3965412272" sldId="326"/>
             <ac:picMk id="17" creationId="{5F051CA7-684A-D321-DC59-3B1D4CCC82FC}"/>
+          </ac:picMkLst>
+        </pc:picChg>
+        <pc:picChg chg="add mod">
+          <ac:chgData name="Michelle Liang" userId="57f98c83a5a0b7ce" providerId="LiveId" clId="{B60CC9B0-2A30-4645-8C53-3421A8BF3E96}" dt="2023-10-28T12:03:50.263" v="20387" actId="164"/>
+          <ac:picMkLst>
+            <pc:docMk/>
+            <pc:sldMk cId="3965412272" sldId="326"/>
+            <ac:picMk id="17" creationId="{AA0BE25F-5224-0E2B-EE3A-C0A062DD84EA}"/>
+          </ac:picMkLst>
+        </pc:picChg>
+        <pc:picChg chg="add mod">
+          <ac:chgData name="Michelle Liang" userId="57f98c83a5a0b7ce" providerId="LiveId" clId="{B60CC9B0-2A30-4645-8C53-3421A8BF3E96}" dt="2023-10-28T12:09:49.371" v="21100" actId="164"/>
+          <ac:picMkLst>
+            <pc:docMk/>
+            <pc:sldMk cId="3965412272" sldId="326"/>
+            <ac:picMk id="21" creationId="{F1C9FF7C-BF1B-A84A-5A15-8B8DA4DCE377}"/>
           </ac:picMkLst>
         </pc:picChg>
       </pc:sldChg>
@@ -3195,7 +3259,7 @@
           <a:p>
             <a:r>
               <a:rPr lang="en-US" dirty="0"/>
-              <a:t>Finally, we have the scheduling feature. In figure 1, the time stamps are set in lines 185-192. This is done by multiplying the number of days till the wedding (which was returned in the get_details() function and stored in the second element of ‘user_details’ earlier) with a value between 0 and 1. So line 185 multiplies days left with 0.1 giving us a timestamp at 90% of they days remaining till the wedding. This figure is then added to today’s date in lines 194-202 which gives us an exact date in dd/mm/</a:t>
+              <a:t>Finally, we have the scheduling feature. In figure 1, important timestamps are written in a list called timestamps (line 186). We then iterate through the list and multiply the number of days till the wedding (which was returned in the get_details() function and stored in the second element of ‘user_details’ earlier) with the elements in the list. This gives us the number of days each timestamp equates to relative to the number of days till the wedding. A new list is created called dates in line 194 which iterates through ‘tasks’ and adds the days in task to today’s date which gives us an exact date in dd/mm/</a:t>
             </a:r>
             <a:r>
               <a:rPr lang="en-US" dirty="0" err="1"/>
@@ -3203,7 +3267,7 @@
             </a:r>
             <a:r>
               <a:rPr lang="en-US" dirty="0"/>
-              <a:t> format. Finally in figure 2, we open the weddingplan text again and append it with important tasks for the couple to do before the wedding date. </a:t>
+              <a:t> format for each new element. Finally in figure 2, we open the weddingplan text again and append it with important tasks for the couple to do before the wedding date. </a:t>
             </a:r>
           </a:p>
           <a:p>
@@ -3212,7 +3276,7 @@
           <a:p>
             <a:r>
               <a:rPr lang="en-US" dirty="0"/>
-              <a:t>At the very end, we open the file for the user in notepad (line 238, figure 3) to let the user save the file to their local PC. Once the user is done they can close the file and a final thank you message is printed  (line 240-241)!</a:t>
+              <a:t>At the very end, we open the file for the user in notepad (line 229, figure 3) to let the user save the file to their local PC. Once the user is done they can close the file and a final thank you message is printed  (line 231-232)!</a:t>
             </a:r>
           </a:p>
         </p:txBody>
@@ -16138,8 +16202,8 @@
         </p:nvSpPr>
         <p:spPr>
           <a:xfrm>
-            <a:off x="6683219" y="83909"/>
-            <a:ext cx="4345686" cy="649224"/>
+            <a:off x="6491512" y="619143"/>
+            <a:ext cx="3578381" cy="1224192"/>
           </a:xfrm>
         </p:spPr>
         <p:txBody>
@@ -16147,12 +16211,12 @@
           <a:lstStyle/>
           <a:p>
             <a:r>
-              <a:rPr lang="en-US" sz="2800" b="1" dirty="0">
+              <a:rPr lang="en-US" b="1" dirty="0">
                 <a:solidFill>
                   <a:schemeClr val="bg2"/>
                 </a:solidFill>
               </a:rPr>
-              <a:t>Scheduling and Ending</a:t>
+              <a:t>Scheduling and Ending </a:t>
             </a:r>
           </a:p>
         </p:txBody>
@@ -16215,42 +16279,12 @@
           </a:p>
         </p:txBody>
       </p:sp>
-      <p:pic>
-        <p:nvPicPr>
-          <p:cNvPr id="10" name="Picture 9">
-            <a:extLst>
-              <a:ext uri="{FF2B5EF4-FFF2-40B4-BE49-F238E27FC236}">
-                <a16:creationId xmlns:a16="http://schemas.microsoft.com/office/drawing/2014/main" id="{8F1A53E1-70C8-53B2-A042-DA3118FA4EC2}"/>
-              </a:ext>
-            </a:extLst>
-          </p:cNvPr>
-          <p:cNvPicPr>
-            <a:picLocks noChangeAspect="1"/>
-          </p:cNvPicPr>
-          <p:nvPr/>
-        </p:nvPicPr>
-        <p:blipFill>
-          <a:blip r:embed="rId3"/>
-          <a:stretch>
-            <a:fillRect/>
-          </a:stretch>
-        </p:blipFill>
-        <p:spPr>
-          <a:xfrm>
-            <a:off x="139839" y="5689182"/>
-            <a:ext cx="5956161" cy="1032293"/>
-          </a:xfrm>
-          <a:prstGeom prst="rect">
-            <a:avLst/>
-          </a:prstGeom>
-        </p:spPr>
-      </p:pic>
       <p:grpSp>
         <p:nvGrpSpPr>
-          <p:cNvPr id="12" name="Group 11">
-            <a:extLst>
-              <a:ext uri="{FF2B5EF4-FFF2-40B4-BE49-F238E27FC236}">
-                <a16:creationId xmlns:a16="http://schemas.microsoft.com/office/drawing/2014/main" id="{BEB2DFE5-1164-EFFC-A0A8-62EBF233C75A}"/>
+          <p:cNvPr id="9" name="Group 8">
+            <a:extLst>
+              <a:ext uri="{FF2B5EF4-FFF2-40B4-BE49-F238E27FC236}">
+                <a16:creationId xmlns:a16="http://schemas.microsoft.com/office/drawing/2014/main" id="{EFCECCC4-4C4F-9835-A04D-964B7792FA43}"/>
               </a:ext>
             </a:extLst>
           </p:cNvPr>
@@ -16259,18 +16293,18 @@
         </p:nvGrpSpPr>
         <p:grpSpPr>
           <a:xfrm>
-            <a:off x="215546" y="563401"/>
-            <a:ext cx="6136209" cy="4775974"/>
-            <a:chOff x="215546" y="563401"/>
-            <a:chExt cx="6136209" cy="4775974"/>
+            <a:off x="6096000" y="2852993"/>
+            <a:ext cx="6330141" cy="2038970"/>
+            <a:chOff x="384632" y="1894049"/>
+            <a:chExt cx="6330141" cy="2038970"/>
           </a:xfrm>
         </p:grpSpPr>
         <p:pic>
           <p:nvPicPr>
-            <p:cNvPr id="4" name="Picture 3">
+            <p:cNvPr id="7" name="Picture 6">
               <a:extLst>
                 <a:ext uri="{FF2B5EF4-FFF2-40B4-BE49-F238E27FC236}">
-                  <a16:creationId xmlns:a16="http://schemas.microsoft.com/office/drawing/2014/main" id="{206B039F-BBA4-70D7-F92F-D927E4FFA4EC}"/>
+                  <a16:creationId xmlns:a16="http://schemas.microsoft.com/office/drawing/2014/main" id="{62777A38-9C4D-E918-3ECF-F4DAED0071AF}"/>
                 </a:ext>
               </a:extLst>
             </p:cNvPr>
@@ -16280,15 +16314,15 @@
             <p:nvPr/>
           </p:nvPicPr>
           <p:blipFill>
-            <a:blip r:embed="rId4"/>
+            <a:blip r:embed="rId3"/>
             <a:stretch>
               <a:fillRect/>
             </a:stretch>
           </p:blipFill>
           <p:spPr>
             <a:xfrm>
-              <a:off x="215546" y="563401"/>
-              <a:ext cx="5804745" cy="4775974"/>
+              <a:off x="384632" y="1894049"/>
+              <a:ext cx="5956161" cy="2038970"/>
             </a:xfrm>
             <a:prstGeom prst="rect">
               <a:avLst/>
@@ -16309,7 +16343,7 @@
           </p:nvSpPr>
           <p:spPr>
             <a:xfrm>
-              <a:off x="5258200" y="581860"/>
+              <a:off x="5621218" y="1894049"/>
               <a:ext cx="1093555" cy="272438"/>
             </a:xfrm>
             <a:prstGeom prst="rect">
@@ -16337,10 +16371,10 @@
       </p:grpSp>
       <p:grpSp>
         <p:nvGrpSpPr>
-          <p:cNvPr id="16" name="Group 15">
-            <a:extLst>
-              <a:ext uri="{FF2B5EF4-FFF2-40B4-BE49-F238E27FC236}">
-                <a16:creationId xmlns:a16="http://schemas.microsoft.com/office/drawing/2014/main" id="{B47D0846-9D19-A4BC-1DBD-B631EC4616D4}"/>
+          <p:cNvPr id="19" name="Group 18">
+            <a:extLst>
+              <a:ext uri="{FF2B5EF4-FFF2-40B4-BE49-F238E27FC236}">
+                <a16:creationId xmlns:a16="http://schemas.microsoft.com/office/drawing/2014/main" id="{4BB3B0E6-5AA7-F90A-9C6D-24F7A399A0DB}"/>
               </a:ext>
             </a:extLst>
           </p:cNvPr>
@@ -16349,18 +16383,18 @@
         </p:nvGrpSpPr>
         <p:grpSpPr>
           <a:xfrm>
-            <a:off x="6394271" y="854298"/>
-            <a:ext cx="5692339" cy="5706271"/>
-            <a:chOff x="6394271" y="854298"/>
-            <a:chExt cx="5692339" cy="5706271"/>
+            <a:off x="262023" y="571101"/>
+            <a:ext cx="5431011" cy="5715798"/>
+            <a:chOff x="425827" y="267532"/>
+            <a:chExt cx="5431011" cy="5715798"/>
           </a:xfrm>
         </p:grpSpPr>
         <p:pic>
           <p:nvPicPr>
-            <p:cNvPr id="8" name="Picture 7">
+            <p:cNvPr id="17" name="Picture 16">
               <a:extLst>
                 <a:ext uri="{FF2B5EF4-FFF2-40B4-BE49-F238E27FC236}">
-                  <a16:creationId xmlns:a16="http://schemas.microsoft.com/office/drawing/2014/main" id="{F50F6340-1972-F365-6163-D3682125A2AA}"/>
+                  <a16:creationId xmlns:a16="http://schemas.microsoft.com/office/drawing/2014/main" id="{AA0BE25F-5224-0E2B-EE3A-C0A062DD84EA}"/>
                 </a:ext>
               </a:extLst>
             </p:cNvPr>
@@ -16370,15 +16404,15 @@
             <p:nvPr/>
           </p:nvPicPr>
           <p:blipFill>
-            <a:blip r:embed="rId5"/>
+            <a:blip r:embed="rId4"/>
             <a:stretch>
               <a:fillRect/>
             </a:stretch>
           </p:blipFill>
           <p:spPr>
             <a:xfrm>
-              <a:off x="6394271" y="854298"/>
-              <a:ext cx="5287113" cy="5706271"/>
+              <a:off x="425827" y="267532"/>
+              <a:ext cx="5191850" cy="5715798"/>
             </a:xfrm>
             <a:prstGeom prst="rect">
               <a:avLst/>
@@ -16399,7 +16433,7 @@
           </p:nvSpPr>
           <p:spPr>
             <a:xfrm>
-              <a:off x="10993055" y="6260148"/>
+              <a:off x="4763283" y="5634690"/>
               <a:ext cx="1093555" cy="253916"/>
             </a:xfrm>
             <a:prstGeom prst="rect">
@@ -16425,45 +16459,96 @@
           </p:txBody>
         </p:sp>
       </p:grpSp>
-      <p:sp>
-        <p:nvSpPr>
-          <p:cNvPr id="18" name="TextBox 17">
-            <a:extLst>
-              <a:ext uri="{FF2B5EF4-FFF2-40B4-BE49-F238E27FC236}">
-                <a16:creationId xmlns:a16="http://schemas.microsoft.com/office/drawing/2014/main" id="{A8570616-712A-AA01-28DB-CBE56FA32CF8}"/>
-              </a:ext>
-            </a:extLst>
-          </p:cNvPr>
-          <p:cNvSpPr txBox="1"/>
+      <p:grpSp>
+        <p:nvGrpSpPr>
+          <p:cNvPr id="23" name="Group 22">
+            <a:extLst>
+              <a:ext uri="{FF2B5EF4-FFF2-40B4-BE49-F238E27FC236}">
+                <a16:creationId xmlns:a16="http://schemas.microsoft.com/office/drawing/2014/main" id="{4E5039C4-0133-F935-C352-F7E74D3C515D}"/>
+              </a:ext>
+            </a:extLst>
+          </p:cNvPr>
+          <p:cNvGrpSpPr/>
           <p:nvPr/>
-        </p:nvSpPr>
-        <p:spPr>
+        </p:nvGrpSpPr>
+        <p:grpSpPr>
           <a:xfrm>
-            <a:off x="5390186" y="5731264"/>
-            <a:ext cx="1093555" cy="253916"/>
+            <a:off x="6096000" y="5209865"/>
+            <a:ext cx="6400440" cy="893257"/>
+            <a:chOff x="6096000" y="5209865"/>
+            <a:chExt cx="6400440" cy="893257"/>
           </a:xfrm>
-          <a:prstGeom prst="rect">
-            <a:avLst/>
-          </a:prstGeom>
-          <a:noFill/>
-        </p:spPr>
-        <p:txBody>
-          <a:bodyPr wrap="square" rtlCol="0">
-            <a:spAutoFit/>
-          </a:bodyPr>
-          <a:lstStyle/>
-          <a:p>
-            <a:r>
-              <a:rPr lang="en-US" sz="1050" dirty="0">
-                <a:solidFill>
-                  <a:schemeClr val="bg1"/>
-                </a:solidFill>
-              </a:rPr>
-              <a:t>Figure 3</a:t>
-            </a:r>
-          </a:p>
-        </p:txBody>
-      </p:sp>
+        </p:grpSpPr>
+        <p:pic>
+          <p:nvPicPr>
+            <p:cNvPr id="21" name="Picture 20">
+              <a:extLst>
+                <a:ext uri="{FF2B5EF4-FFF2-40B4-BE49-F238E27FC236}">
+                  <a16:creationId xmlns:a16="http://schemas.microsoft.com/office/drawing/2014/main" id="{F1C9FF7C-BF1B-A84A-5A15-8B8DA4DCE377}"/>
+                </a:ext>
+              </a:extLst>
+            </p:cNvPr>
+            <p:cNvPicPr>
+              <a:picLocks noChangeAspect="1"/>
+            </p:cNvPicPr>
+            <p:nvPr/>
+          </p:nvPicPr>
+          <p:blipFill>
+            <a:blip r:embed="rId5"/>
+            <a:stretch>
+              <a:fillRect/>
+            </a:stretch>
+          </p:blipFill>
+          <p:spPr>
+            <a:xfrm>
+              <a:off x="6096000" y="5209865"/>
+              <a:ext cx="6062567" cy="893257"/>
+            </a:xfrm>
+            <a:prstGeom prst="rect">
+              <a:avLst/>
+            </a:prstGeom>
+          </p:spPr>
+        </p:pic>
+        <p:sp>
+          <p:nvSpPr>
+            <p:cNvPr id="22" name="TextBox 21">
+              <a:extLst>
+                <a:ext uri="{FF2B5EF4-FFF2-40B4-BE49-F238E27FC236}">
+                  <a16:creationId xmlns:a16="http://schemas.microsoft.com/office/drawing/2014/main" id="{605B5172-ED50-0727-F605-8A4494C721F8}"/>
+                </a:ext>
+              </a:extLst>
+            </p:cNvPr>
+            <p:cNvSpPr txBox="1"/>
+            <p:nvPr/>
+          </p:nvSpPr>
+          <p:spPr>
+            <a:xfrm>
+              <a:off x="11402885" y="5209865"/>
+              <a:ext cx="1093555" cy="253916"/>
+            </a:xfrm>
+            <a:prstGeom prst="rect">
+              <a:avLst/>
+            </a:prstGeom>
+            <a:noFill/>
+          </p:spPr>
+          <p:txBody>
+            <a:bodyPr wrap="square" rtlCol="0">
+              <a:spAutoFit/>
+            </a:bodyPr>
+            <a:lstStyle/>
+            <a:p>
+              <a:r>
+                <a:rPr lang="en-US" sz="1050" dirty="0">
+                  <a:solidFill>
+                    <a:schemeClr val="bg1"/>
+                  </a:solidFill>
+                </a:rPr>
+                <a:t>Figure 3</a:t>
+              </a:r>
+            </a:p>
+          </p:txBody>
+        </p:sp>
+      </p:grpSp>
     </p:spTree>
     <p:extLst>
       <p:ext uri="{BB962C8B-B14F-4D97-AF65-F5344CB8AC3E}">
@@ -20519,6 +20604,15 @@
 </file>
 
 <file path=customXml/item1.xml><?xml version="1.0" encoding="utf-8"?>
+<?mso-contentType ?>
+<FormTemplates xmlns="http://schemas.microsoft.com/sharepoint/v3/contenttype/forms">
+  <Display>DocumentLibraryForm</Display>
+  <Edit>DocumentLibraryForm</Edit>
+  <New>DocumentLibraryForm</New>
+</FormTemplates>
+</file>
+
+<file path=customXml/item2.xml><?xml version="1.0" encoding="utf-8"?>
 <p:properties xmlns:p="http://schemas.microsoft.com/office/2006/metadata/properties" xmlns:xsi="http://www.w3.org/2001/XMLSchema-instance" xmlns:pc="http://schemas.microsoft.com/office/infopath/2007/PartnerControls">
   <documentManagement>
     <_ip_UnifiedCompliancePolicyUIAction xmlns="http://schemas.microsoft.com/sharepoint/v3" xsi:nil="true"/>
@@ -20536,15 +20630,6 @@
     <MediaServiceKeyPoints xmlns="71af3243-3dd4-4a8d-8c0d-dd76da1f02a5" xsi:nil="true"/>
   </documentManagement>
 </p:properties>
-</file>
-
-<file path=customXml/item2.xml><?xml version="1.0" encoding="utf-8"?>
-<?mso-contentType ?>
-<FormTemplates xmlns="http://schemas.microsoft.com/sharepoint/v3/contenttype/forms">
-  <Display>DocumentLibraryForm</Display>
-  <Edit>DocumentLibraryForm</Edit>
-  <New>DocumentLibraryForm</New>
-</FormTemplates>
 </file>
 
 <file path=customXml/item3.xml><?xml version="1.0" encoding="utf-8"?>
@@ -20860,6 +20945,14 @@
 </file>
 
 <file path=customXml/itemProps1.xml><?xml version="1.0" encoding="utf-8"?>
+<ds:datastoreItem xmlns:ds="http://schemas.openxmlformats.org/officeDocument/2006/customXml" ds:itemID="{46331494-2B4C-4D3C-A5D2-BA1DC99CD22C}">
+  <ds:schemaRefs>
+    <ds:schemaRef ds:uri="http://schemas.microsoft.com/sharepoint/v3/contenttype/forms"/>
+  </ds:schemaRefs>
+</ds:datastoreItem>
+</file>
+
+<file path=customXml/itemProps2.xml><?xml version="1.0" encoding="utf-8"?>
 <ds:datastoreItem xmlns:ds="http://schemas.openxmlformats.org/officeDocument/2006/customXml" ds:itemID="{CE69D2E8-20DE-4F32-923E-07859F820D7B}">
   <ds:schemaRefs>
     <ds:schemaRef ds:uri="http://schemas.microsoft.com/office/2006/metadata/properties"/>
@@ -20874,14 +20967,6 @@
     <ds:schemaRef ds:uri="16c05727-aa75-4e4a-9b5f-8a80a1165891"/>
     <ds:schemaRef ds:uri="http://www.w3.org/XML/1998/namespace"/>
     <ds:schemaRef ds:uri="http://purl.org/dc/dcmitype/"/>
-  </ds:schemaRefs>
-</ds:datastoreItem>
-</file>
-
-<file path=customXml/itemProps2.xml><?xml version="1.0" encoding="utf-8"?>
-<ds:datastoreItem xmlns:ds="http://schemas.openxmlformats.org/officeDocument/2006/customXml" ds:itemID="{46331494-2B4C-4D3C-A5D2-BA1DC99CD22C}">
-  <ds:schemaRefs>
-    <ds:schemaRef ds:uri="http://schemas.microsoft.com/sharepoint/v3/contenttype/forms"/>
   </ds:schemaRefs>
 </ds:datastoreItem>
 </file>

</xml_diff>